<commit_message>
Class thresholds added. Ready to submit
</commit_message>
<xml_diff>
--- a/Final/Urban Sound Classification.pptx
+++ b/Final/Urban Sound Classification.pptx
@@ -13,7 +13,7 @@
     <p:sldId id="268" r:id="rId7"/>
     <p:sldId id="269" r:id="rId8"/>
     <p:sldId id="270" r:id="rId9"/>
-    <p:sldId id="271" r:id="rId10"/>
+    <p:sldId id="274" r:id="rId10"/>
     <p:sldId id="272" r:id="rId11"/>
     <p:sldId id="261" r:id="rId12"/>
     <p:sldId id="262" r:id="rId13"/>
@@ -369,7 +369,7 @@
           <a:p>
             <a:fld id="{9184DA70-C731-4C70-880D-CCD4705E623C}" type="datetime1">
               <a:rPr lang="en-US" smtClean="0"/>
-              <a:t>5/3/2021</a:t>
+              <a:t>5/6/2021</a:t>
             </a:fld>
             <a:endParaRPr lang="en-US" dirty="0"/>
           </a:p>
@@ -557,7 +557,7 @@
           <a:p>
             <a:fld id="{B612A279-0833-481D-8C56-F67FD0AC6C50}" type="datetime1">
               <a:rPr lang="en-US" smtClean="0"/>
-              <a:t>5/3/2021</a:t>
+              <a:t>5/6/2021</a:t>
             </a:fld>
             <a:endParaRPr lang="en-US" dirty="0"/>
           </a:p>
@@ -799,7 +799,7 @@
           <a:p>
             <a:fld id="{6587DA83-5663-4C9C-B9AA-0B40A3DAFF81}" type="datetime1">
               <a:rPr lang="en-US" smtClean="0"/>
-              <a:t>5/3/2021</a:t>
+              <a:t>5/6/2021</a:t>
             </a:fld>
             <a:endParaRPr lang="en-US" dirty="0"/>
           </a:p>
@@ -987,7 +987,7 @@
           <a:p>
             <a:fld id="{4BE1D723-8F53-4F53-90B0-1982A396982E}" type="datetime1">
               <a:rPr lang="en-US" smtClean="0"/>
-              <a:t>5/3/2021</a:t>
+              <a:t>5/6/2021</a:t>
             </a:fld>
             <a:endParaRPr lang="en-US" dirty="0"/>
           </a:p>
@@ -1360,7 +1360,7 @@
           <a:p>
             <a:fld id="{97669AF7-7BEB-44E4-9852-375E34362B5B}" type="datetime1">
               <a:rPr lang="en-US" smtClean="0"/>
-              <a:t>5/3/2021</a:t>
+              <a:t>5/6/2021</a:t>
             </a:fld>
             <a:endParaRPr lang="en-US" dirty="0"/>
           </a:p>
@@ -1615,7 +1615,7 @@
           <a:p>
             <a:fld id="{BAAAC38D-0552-4C82-B593-E6124DFADBE2}" type="datetime1">
               <a:rPr lang="en-US" smtClean="0"/>
-              <a:t>5/3/2021</a:t>
+              <a:t>5/6/2021</a:t>
             </a:fld>
             <a:endParaRPr lang="en-US" dirty="0"/>
           </a:p>
@@ -2012,7 +2012,7 @@
           <a:p>
             <a:fld id="{D9DF0F1C-5577-4ACB-BB62-DF8F3C494C7E}" type="datetime1">
               <a:rPr lang="en-US" smtClean="0"/>
-              <a:t>5/3/2021</a:t>
+              <a:t>5/6/2021</a:t>
             </a:fld>
             <a:endParaRPr lang="en-US" dirty="0"/>
           </a:p>
@@ -2148,7 +2148,7 @@
           <a:p>
             <a:fld id="{1775B394-D9F9-4F0C-B15D-605F45CB9E9F}" type="datetime1">
               <a:rPr lang="en-US" smtClean="0"/>
-              <a:t>5/3/2021</a:t>
+              <a:t>5/6/2021</a:t>
             </a:fld>
             <a:endParaRPr lang="en-US" dirty="0"/>
           </a:p>
@@ -2305,7 +2305,7 @@
           <a:p>
             <a:fld id="{39667345-2558-425A-8533-9BFDBCE15005}" type="datetime1">
               <a:rPr lang="en-US" smtClean="0"/>
-              <a:t>5/3/2021</a:t>
+              <a:t>5/6/2021</a:t>
             </a:fld>
             <a:endParaRPr lang="en-US" dirty="0"/>
           </a:p>
@@ -2634,7 +2634,7 @@
           <a:p>
             <a:fld id="{92BEA474-078D-4E9B-9B14-09A87B19DC46}" type="datetime1">
               <a:rPr lang="en-US" smtClean="0"/>
-              <a:t>5/3/2021</a:t>
+              <a:t>5/6/2021</a:t>
             </a:fld>
             <a:endParaRPr lang="en-US" dirty="0"/>
           </a:p>
@@ -2984,7 +2984,7 @@
           <a:p>
             <a:fld id="{4907D986-8816-4272-A432-0437A28A9828}" type="datetime1">
               <a:rPr lang="en-US" smtClean="0"/>
-              <a:t>5/3/2021</a:t>
+              <a:t>5/6/2021</a:t>
             </a:fld>
             <a:endParaRPr lang="en-US" dirty="0"/>
           </a:p>
@@ -3245,7 +3245,7 @@
           <a:p>
             <a:fld id="{62D6E202-B606-4609-B914-27C9371A1F6D}" type="datetime1">
               <a:rPr lang="en-US" smtClean="0"/>
-              <a:t>5/3/2021</a:t>
+              <a:t>5/6/2021</a:t>
             </a:fld>
             <a:endParaRPr lang="en-US" dirty="0"/>
           </a:p>
@@ -4100,7 +4100,10 @@
           <a:bodyPr/>
           <a:lstStyle/>
           <a:p>
-            <a:endParaRPr lang="en-US" dirty="0"/>
+            <a:r>
+              <a:rPr lang="en-US" dirty="0"/>
+              <a:t>Maximizing our precision/recall combination, we would be able to predict more than one class if two sounds are happening in the same observation</a:t>
+            </a:r>
           </a:p>
         </p:txBody>
       </p:sp>
@@ -6553,36 +6556,47 @@
       </p:grpSpPr>
       <p:sp>
         <p:nvSpPr>
-          <p:cNvPr id="2" name="Picture Placeholder 1">
-            <a:extLst>
-              <a:ext uri="{FF2B5EF4-FFF2-40B4-BE49-F238E27FC236}">
-                <a16:creationId xmlns:a16="http://schemas.microsoft.com/office/drawing/2014/main" id="{1CEBC0E6-4D0C-4860-BF79-34DDA9A6270D}"/>
-              </a:ext>
-            </a:extLst>
-          </p:cNvPr>
-          <p:cNvSpPr>
-            <a:spLocks noGrp="1"/>
-          </p:cNvSpPr>
-          <p:nvPr>
-            <p:ph type="pic" idx="1"/>
+          <p:cNvPr id="2" name="Title 1">
+            <a:extLst>
+              <a:ext uri="{FF2B5EF4-FFF2-40B4-BE49-F238E27FC236}">
+                <a16:creationId xmlns:a16="http://schemas.microsoft.com/office/drawing/2014/main" id="{053E48E6-192C-4129-A754-869489210A40}"/>
+              </a:ext>
+            </a:extLst>
+          </p:cNvPr>
+          <p:cNvSpPr>
+            <a:spLocks noGrp="1"/>
+          </p:cNvSpPr>
+          <p:nvPr>
+            <p:ph type="title"/>
           </p:nvPr>
         </p:nvSpPr>
         <p:spPr/>
-      </p:sp>
-      <p:sp>
-        <p:nvSpPr>
-          <p:cNvPr id="3" name="Title 2">
-            <a:extLst>
-              <a:ext uri="{FF2B5EF4-FFF2-40B4-BE49-F238E27FC236}">
-                <a16:creationId xmlns:a16="http://schemas.microsoft.com/office/drawing/2014/main" id="{F494C5EF-82EE-47A5-BD36-F4BED1C20FAE}"/>
-              </a:ext>
-            </a:extLst>
-          </p:cNvPr>
-          <p:cNvSpPr>
-            <a:spLocks noGrp="1"/>
-          </p:cNvSpPr>
-          <p:nvPr>
-            <p:ph type="title"/>
+        <p:txBody>
+          <a:bodyPr/>
+          <a:lstStyle/>
+          <a:p>
+            <a:r>
+              <a:rPr lang="en-US" dirty="0" err="1"/>
+              <a:t>AutoKeras</a:t>
+            </a:r>
+            <a:endParaRPr lang="en-US" dirty="0"/>
+          </a:p>
+        </p:txBody>
+      </p:sp>
+      <p:sp>
+        <p:nvSpPr>
+          <p:cNvPr id="3" name="Content Placeholder 2">
+            <a:extLst>
+              <a:ext uri="{FF2B5EF4-FFF2-40B4-BE49-F238E27FC236}">
+                <a16:creationId xmlns:a16="http://schemas.microsoft.com/office/drawing/2014/main" id="{48FE5883-8FD8-4336-93F4-BC4B1B8CEF09}"/>
+              </a:ext>
+            </a:extLst>
+          </p:cNvPr>
+          <p:cNvSpPr>
+            <a:spLocks noGrp="1"/>
+          </p:cNvSpPr>
+          <p:nvPr>
+            <p:ph idx="1"/>
           </p:nvPr>
         </p:nvSpPr>
         <p:spPr/>
@@ -6590,37 +6604,42 @@
           <a:bodyPr/>
           <a:lstStyle/>
           <a:p>
+            <a:endParaRPr lang="en-US"/>
+          </a:p>
+        </p:txBody>
+      </p:sp>
+      <p:sp>
+        <p:nvSpPr>
+          <p:cNvPr id="4" name="Text Placeholder 3">
+            <a:extLst>
+              <a:ext uri="{FF2B5EF4-FFF2-40B4-BE49-F238E27FC236}">
+                <a16:creationId xmlns:a16="http://schemas.microsoft.com/office/drawing/2014/main" id="{C696C496-A369-448B-88E6-430679D46DB9}"/>
+              </a:ext>
+            </a:extLst>
+          </p:cNvPr>
+          <p:cNvSpPr>
+            <a:spLocks noGrp="1"/>
+          </p:cNvSpPr>
+          <p:nvPr>
+            <p:ph type="body" sz="half" idx="2"/>
+          </p:nvPr>
+        </p:nvSpPr>
+        <p:spPr/>
+        <p:txBody>
+          <a:bodyPr/>
+          <a:lstStyle/>
+          <a:p>
             <a:r>
               <a:rPr lang="en-US" dirty="0"/>
-              <a:t>New model with balanced data</a:t>
-            </a:r>
-          </a:p>
-        </p:txBody>
-      </p:sp>
-      <p:sp>
-        <p:nvSpPr>
-          <p:cNvPr id="4" name="Text Placeholder 3">
-            <a:extLst>
-              <a:ext uri="{FF2B5EF4-FFF2-40B4-BE49-F238E27FC236}">
-                <a16:creationId xmlns:a16="http://schemas.microsoft.com/office/drawing/2014/main" id="{E8CE8167-7AEE-41C5-BE66-DBC3BD48E730}"/>
-              </a:ext>
-            </a:extLst>
-          </p:cNvPr>
-          <p:cNvSpPr>
-            <a:spLocks noGrp="1"/>
-          </p:cNvSpPr>
-          <p:nvPr>
-            <p:ph type="body" sz="half" idx="2"/>
-          </p:nvPr>
-        </p:nvSpPr>
-        <p:spPr/>
-        <p:txBody>
-          <a:bodyPr/>
-          <a:lstStyle/>
-          <a:p>
+              <a:t>Using </a:t>
+            </a:r>
+            <a:r>
+              <a:rPr lang="en-US" dirty="0" err="1"/>
+              <a:t>AutoKeras</a:t>
+            </a:r>
             <a:r>
               <a:rPr lang="en-US" dirty="0"/>
-              <a:t>We ran the balanced data using the same neural network and got an improved accuracy of 94.03%. An improvement of 2.2%.</a:t>
+              <a:t> on our balanced data gave us an accuracy of 95.28%</a:t>
             </a:r>
           </a:p>
         </p:txBody>
@@ -6630,7 +6649,7 @@
           <p:cNvPr id="6" name="Picture 5">
             <a:extLst>
               <a:ext uri="{FF2B5EF4-FFF2-40B4-BE49-F238E27FC236}">
-                <a16:creationId xmlns:a16="http://schemas.microsoft.com/office/drawing/2014/main" id="{89994792-F92E-470D-BF39-6D2977D374E2}"/>
+                <a16:creationId xmlns:a16="http://schemas.microsoft.com/office/drawing/2014/main" id="{FB5FBF50-F375-4F0B-93CF-564196E39CF6}"/>
               </a:ext>
             </a:extLst>
           </p:cNvPr>
@@ -6647,8 +6666,8 @@
         </p:blipFill>
         <p:spPr>
           <a:xfrm>
-            <a:off x="3012448" y="-1803"/>
-            <a:ext cx="6167104" cy="4576547"/>
+            <a:off x="6191380" y="1628775"/>
+            <a:ext cx="4238625" cy="3600450"/>
           </a:xfrm>
           <a:prstGeom prst="rect">
             <a:avLst/>
@@ -6658,7 +6677,7 @@
     </p:spTree>
     <p:extLst>
       <p:ext uri="{BB962C8B-B14F-4D97-AF65-F5344CB8AC3E}">
-        <p14:creationId xmlns:p14="http://schemas.microsoft.com/office/powerpoint/2010/main" val="1494375642"/>
+        <p14:creationId xmlns:p14="http://schemas.microsoft.com/office/powerpoint/2010/main" val="3165264221"/>
       </p:ext>
     </p:extLst>
   </p:cSld>

</xml_diff>